<commit_message>
Edited XMC and MPAX and converted to new template. RJH Edited SMP Basics and converted to new template. RJH
</commit_message>
<xml_diff>
--- a/slides/SMP_basic.pptx
+++ b/slides/SMP_basic.pptx
@@ -24,7 +24,7 @@
     <p:sldId id="300" r:id="rId12"/>
   </p:sldIdLst>
   <p:sldSz cx="9144000" cy="6858000" type="screen4x3"/>
-  <p:notesSz cx="7315200" cy="9601200"/>
+  <p:notesSz cx="7099300" cy="10234613"/>
   <p:custDataLst>
     <p:tags r:id="rId15"/>
   </p:custDataLst>
@@ -193,8 +193,8 @@
         </p:nvSpPr>
         <p:spPr bwMode="auto">
           <a:xfrm>
-            <a:off x="0" y="0"/>
-            <a:ext cx="3169530" cy="479399"/>
+            <a:off x="0" y="1"/>
+            <a:ext cx="3075985" cy="511026"/>
           </a:xfrm>
           <a:prstGeom prst="rect">
             <a:avLst/>
@@ -236,8 +236,8 @@
         </p:nvSpPr>
         <p:spPr bwMode="auto">
           <a:xfrm>
-            <a:off x="4143997" y="0"/>
-            <a:ext cx="3169529" cy="479399"/>
+            <a:off x="4021692" y="1"/>
+            <a:ext cx="3075984" cy="511026"/>
           </a:xfrm>
           <a:prstGeom prst="rect">
             <a:avLst/>
@@ -279,8 +279,8 @@
         </p:nvSpPr>
         <p:spPr bwMode="auto">
           <a:xfrm>
-            <a:off x="0" y="9120150"/>
-            <a:ext cx="3169530" cy="479399"/>
+            <a:off x="0" y="9721828"/>
+            <a:ext cx="3075985" cy="511026"/>
           </a:xfrm>
           <a:prstGeom prst="rect">
             <a:avLst/>
@@ -322,8 +322,8 @@
         </p:nvSpPr>
         <p:spPr bwMode="auto">
           <a:xfrm>
-            <a:off x="4143997" y="9120150"/>
-            <a:ext cx="3169529" cy="479399"/>
+            <a:off x="4021692" y="9721828"/>
+            <a:ext cx="3075984" cy="511026"/>
           </a:xfrm>
           <a:prstGeom prst="rect">
             <a:avLst/>
@@ -401,8 +401,8 @@
         </p:nvSpPr>
         <p:spPr bwMode="auto">
           <a:xfrm>
-            <a:off x="0" y="0"/>
-            <a:ext cx="3169530" cy="479399"/>
+            <a:off x="0" y="1"/>
+            <a:ext cx="3075985" cy="511026"/>
           </a:xfrm>
           <a:prstGeom prst="rect">
             <a:avLst/>
@@ -444,8 +444,8 @@
         </p:nvSpPr>
         <p:spPr bwMode="auto">
           <a:xfrm>
-            <a:off x="4143997" y="0"/>
-            <a:ext cx="3169529" cy="479399"/>
+            <a:off x="4021692" y="1"/>
+            <a:ext cx="3075984" cy="511026"/>
           </a:xfrm>
           <a:prstGeom prst="rect">
             <a:avLst/>
@@ -487,8 +487,8 @@
         </p:nvSpPr>
         <p:spPr bwMode="auto">
           <a:xfrm>
-            <a:off x="1257300" y="720725"/>
-            <a:ext cx="4800600" cy="3600450"/>
+            <a:off x="990600" y="768350"/>
+            <a:ext cx="5118100" cy="3838575"/>
           </a:xfrm>
           <a:prstGeom prst="rect">
             <a:avLst/>
@@ -516,8 +516,8 @@
         </p:nvSpPr>
         <p:spPr bwMode="auto">
           <a:xfrm>
-            <a:off x="731688" y="4560902"/>
-            <a:ext cx="5851824" cy="4319547"/>
+            <a:off x="710093" y="4861796"/>
+            <a:ext cx="5679114" cy="4604517"/>
           </a:xfrm>
           <a:prstGeom prst="rect">
             <a:avLst/>
@@ -587,8 +587,8 @@
         </p:nvSpPr>
         <p:spPr bwMode="auto">
           <a:xfrm>
-            <a:off x="0" y="9120150"/>
-            <a:ext cx="3169530" cy="479399"/>
+            <a:off x="0" y="9721828"/>
+            <a:ext cx="3075985" cy="511026"/>
           </a:xfrm>
           <a:prstGeom prst="rect">
             <a:avLst/>
@@ -630,8 +630,8 @@
         </p:nvSpPr>
         <p:spPr bwMode="auto">
           <a:xfrm>
-            <a:off x="4143997" y="9120150"/>
-            <a:ext cx="3169529" cy="479399"/>
+            <a:off x="4021692" y="9721828"/>
+            <a:ext cx="3075984" cy="511026"/>
           </a:xfrm>
           <a:prstGeom prst="rect">
             <a:avLst/>
@@ -4813,7 +4813,7 @@
         <p:spPr>
           <a:xfrm>
             <a:off x="389299" y="1619702"/>
-            <a:ext cx="7831248" cy="3139321"/>
+            <a:ext cx="7831248" cy="3036729"/>
           </a:xfrm>
           <a:prstGeom prst="rect">
             <a:avLst/>
@@ -4825,43 +4825,51 @@
           </a:bodyPr>
           <a:lstStyle/>
           <a:p>
-            <a:r>
-              <a:rPr lang="en-US" dirty="0" smtClean="0"/>
-              <a:t>Condition variables behave like flags, they enable synchronization between threads based on variable value but without the needs to explicitly pull the flag value</a:t>
-            </a:r>
-          </a:p>
-          <a:p>
-            <a:endParaRPr lang="en-US" dirty="0" smtClean="0"/>
-          </a:p>
-          <a:p>
-            <a:r>
-              <a:rPr lang="en-US" dirty="0" smtClean="0"/>
-              <a:t>The thread gives resources to other threads until the condition variable is ready </a:t>
-            </a:r>
-          </a:p>
-          <a:p>
-            <a:endParaRPr lang="en-US" dirty="0" smtClean="0"/>
-          </a:p>
-          <a:p>
-            <a:r>
-              <a:rPr lang="en-US" dirty="0" smtClean="0"/>
-              <a:t>To prevent race condition (when </a:t>
-            </a:r>
-            <a:r>
-              <a:rPr lang="en-US" dirty="0" smtClean="0"/>
-              <a:t>two threads try to access the same conditional variable at the same time) </a:t>
-            </a:r>
-            <a:r>
-              <a:rPr lang="en-US" dirty="0" smtClean="0"/>
-              <a:t>a</a:t>
-            </a:r>
-            <a:r>
-              <a:rPr lang="en-US" dirty="0" smtClean="0"/>
-              <a:t> </a:t>
-            </a:r>
-            <a:r>
-              <a:rPr lang="en-US" dirty="0" smtClean="0"/>
-              <a:t>condition variable is always used in conjunction with a mutex lock. </a:t>
+            <a:pPr marL="365760" indent="-365760" eaLnBrk="0" hangingPunct="0">
+              <a:spcBef>
+                <a:spcPts val="800"/>
+              </a:spcBef>
+              <a:buFont typeface="Arial" pitchFamily="34" charset="0"/>
+              <a:buChar char="•"/>
+            </a:pPr>
+            <a:r>
+              <a:rPr lang="en-US" sz="2000" dirty="0" smtClean="0">
+                <a:latin typeface="Calibri" pitchFamily="34" charset="0"/>
+                <a:cs typeface="Calibri" pitchFamily="34" charset="0"/>
+              </a:rPr>
+              <a:t>Condition variables behave like flags, they enable synchronization between threads based on variable value but without the need to explicitly pull the flag value.</a:t>
+            </a:r>
+          </a:p>
+          <a:p>
+            <a:pPr marL="365760" indent="-365760" eaLnBrk="0" hangingPunct="0">
+              <a:spcBef>
+                <a:spcPts val="800"/>
+              </a:spcBef>
+              <a:buFont typeface="Arial" pitchFamily="34" charset="0"/>
+              <a:buChar char="•"/>
+            </a:pPr>
+            <a:r>
+              <a:rPr lang="en-US" sz="2000" dirty="0" smtClean="0">
+                <a:latin typeface="Calibri" pitchFamily="34" charset="0"/>
+                <a:cs typeface="Calibri" pitchFamily="34" charset="0"/>
+              </a:rPr>
+              <a:t>The thread gives resources to other threads until the condition variable is ready.</a:t>
+            </a:r>
+          </a:p>
+          <a:p>
+            <a:pPr marL="365760" indent="-365760" eaLnBrk="0" hangingPunct="0">
+              <a:spcBef>
+                <a:spcPts val="800"/>
+              </a:spcBef>
+              <a:buFont typeface="Arial" pitchFamily="34" charset="0"/>
+              <a:buChar char="•"/>
+            </a:pPr>
+            <a:r>
+              <a:rPr lang="en-US" sz="2000" dirty="0" smtClean="0">
+                <a:latin typeface="Calibri" pitchFamily="34" charset="0"/>
+                <a:cs typeface="Calibri" pitchFamily="34" charset="0"/>
+              </a:rPr>
+              <a:t>To prevent race condition (when two threads try to access the same conditional variable at the same time), a condition variable is always used in conjunction with a mutex lock. </a:t>
             </a:r>
           </a:p>
           <a:p>
@@ -4926,11 +4934,7 @@
             <a:pPr algn="ctr"/>
             <a:r>
               <a:rPr lang="en-US" sz="3600" dirty="0" smtClean="0"/>
-              <a:t>SMP </a:t>
-            </a:r>
-            <a:r>
-              <a:rPr lang="en-US" sz="3600" dirty="0" smtClean="0"/>
-              <a:t>demo In MCSDK Release</a:t>
+              <a:t>SMP Demo In MCSDK Release</a:t>
             </a:r>
             <a:endParaRPr lang="en-US" sz="3600" dirty="0"/>
           </a:p>
@@ -4969,7 +4973,7 @@
         <p:spPr>
           <a:xfrm>
             <a:off x="371192" y="2181885"/>
-            <a:ext cx="7813141" cy="3416320"/>
+            <a:ext cx="8372758" cy="3662541"/>
           </a:xfrm>
           <a:prstGeom prst="rect">
             <a:avLst/>
@@ -4983,58 +4987,97 @@
           <a:lstStyle/>
           <a:p>
             <a:r>
+              <a:rPr lang="en-US" dirty="0" smtClean="0">
+                <a:latin typeface="Calibri" pitchFamily="34" charset="0"/>
+                <a:cs typeface="Calibri" pitchFamily="34" charset="0"/>
+              </a:rPr>
+              <a:t>Part of the release at: </a:t>
+            </a:r>
+          </a:p>
+          <a:p>
+            <a:endParaRPr lang="en-US" dirty="0" smtClean="0"/>
+          </a:p>
+          <a:p>
+            <a:r>
+              <a:rPr lang="en-US" sz="1600" b="1" dirty="0" smtClean="0">
+                <a:latin typeface="Courier New" pitchFamily="49" charset="0"/>
+                <a:cs typeface="Courier New" pitchFamily="49" charset="0"/>
+              </a:rPr>
+              <a:t>MCSDK_3_15\mcsdk_linux_3_00_03_15\example-applications\</a:t>
+            </a:r>
+            <a:r>
+              <a:rPr lang="en-US" sz="1600" b="1" dirty="0" err="1" smtClean="0">
+                <a:latin typeface="Courier New" pitchFamily="49" charset="0"/>
+                <a:cs typeface="Courier New" pitchFamily="49" charset="0"/>
+              </a:rPr>
+              <a:t>smp_test</a:t>
+            </a:r>
+            <a:endParaRPr lang="en-US" sz="1600" b="1" dirty="0" smtClean="0">
+              <a:latin typeface="Courier New" pitchFamily="49" charset="0"/>
+              <a:cs typeface="Courier New" pitchFamily="49" charset="0"/>
+            </a:endParaRPr>
+          </a:p>
+          <a:p>
+            <a:endParaRPr lang="en-US" dirty="0" smtClean="0"/>
+          </a:p>
+          <a:p>
+            <a:r>
+              <a:rPr lang="en-US" dirty="0" smtClean="0">
+                <a:latin typeface="Calibri" pitchFamily="34" charset="0"/>
+                <a:cs typeface="Calibri" pitchFamily="34" charset="0"/>
+              </a:rPr>
+              <a:t>Need to add:</a:t>
+            </a:r>
+          </a:p>
+          <a:p>
+            <a:r>
               <a:rPr lang="en-US" dirty="0" smtClean="0"/>
-              <a:t>Part of the release at </a:t>
-            </a:r>
-          </a:p>
-          <a:p>
-            <a:endParaRPr lang="en-US" dirty="0" smtClean="0"/>
-          </a:p>
-          <a:p>
-            <a:r>
-              <a:rPr lang="en-US" dirty="0" smtClean="0"/>
-              <a:t>MCSDK_3_15\mcsdk_linux_3_00_03_15\example-applications\</a:t>
-            </a:r>
-            <a:r>
-              <a:rPr lang="en-US" dirty="0" err="1" smtClean="0"/>
-              <a:t>smp_test</a:t>
-            </a:r>
-            <a:endParaRPr lang="en-US" dirty="0" smtClean="0"/>
-          </a:p>
-          <a:p>
-            <a:endParaRPr lang="en-US" dirty="0" smtClean="0"/>
-          </a:p>
-          <a:p>
-            <a:r>
-              <a:rPr lang="en-US" dirty="0" smtClean="0"/>
-              <a:t>Need to add </a:t>
-            </a:r>
-          </a:p>
-          <a:p>
-            <a:r>
-              <a:rPr lang="en-US" dirty="0" smtClean="0"/>
-              <a:t>   #include &lt;</a:t>
-            </a:r>
-            <a:r>
-              <a:rPr lang="en-US" dirty="0" err="1" smtClean="0"/>
+              <a:t> </a:t>
+            </a:r>
+          </a:p>
+          <a:p>
+            <a:r>
+              <a:rPr lang="en-US" sz="1600" b="1" dirty="0" smtClean="0">
+                <a:latin typeface="Courier New" pitchFamily="49" charset="0"/>
+                <a:cs typeface="Courier New" pitchFamily="49" charset="0"/>
+              </a:rPr>
+              <a:t>#include &lt;</a:t>
+            </a:r>
+            <a:r>
+              <a:rPr lang="en-US" sz="1600" b="1" dirty="0" err="1" smtClean="0">
+                <a:latin typeface="Courier New" pitchFamily="49" charset="0"/>
+                <a:cs typeface="Courier New" pitchFamily="49" charset="0"/>
+              </a:rPr>
               <a:t>time.h</a:t>
             </a:r>
             <a:r>
-              <a:rPr lang="en-US" dirty="0" smtClean="0"/>
+              <a:rPr lang="en-US" sz="1600" b="1" dirty="0" smtClean="0">
+                <a:latin typeface="Courier New" pitchFamily="49" charset="0"/>
+                <a:cs typeface="Courier New" pitchFamily="49" charset="0"/>
+              </a:rPr>
               <a:t>&gt;</a:t>
             </a:r>
           </a:p>
           <a:p>
             <a:r>
-              <a:rPr lang="en-US" dirty="0" smtClean="0"/>
-              <a:t> #include &lt;linux/</a:t>
-            </a:r>
-            <a:r>
-              <a:rPr lang="en-US" dirty="0" err="1" smtClean="0"/>
+              <a:rPr lang="en-US" sz="1600" b="1" dirty="0" smtClean="0">
+                <a:latin typeface="Courier New" pitchFamily="49" charset="0"/>
+                <a:cs typeface="Courier New" pitchFamily="49" charset="0"/>
+              </a:rPr>
+              <a:t>#include &lt;linux/</a:t>
+            </a:r>
+            <a:r>
+              <a:rPr lang="en-US" sz="1600" b="1" dirty="0" err="1" smtClean="0">
+                <a:latin typeface="Courier New" pitchFamily="49" charset="0"/>
+                <a:cs typeface="Courier New" pitchFamily="49" charset="0"/>
+              </a:rPr>
               <a:t>sched.h</a:t>
             </a:r>
             <a:r>
-              <a:rPr lang="en-US" dirty="0" smtClean="0"/>
+              <a:rPr lang="en-US" sz="1600" b="1" dirty="0" smtClean="0">
+                <a:latin typeface="Courier New" pitchFamily="49" charset="0"/>
+                <a:cs typeface="Courier New" pitchFamily="49" charset="0"/>
+              </a:rPr>
               <a:t>&gt;</a:t>
             </a:r>
           </a:p>
@@ -5151,7 +5194,7 @@
         <p:spPr>
           <a:xfrm>
             <a:off x="860079" y="1768030"/>
-            <a:ext cx="6735778" cy="3970318"/>
+            <a:ext cx="6735778" cy="3139321"/>
           </a:xfrm>
           <a:prstGeom prst="rect">
             <a:avLst/>
@@ -5164,64 +5207,90 @@
           <a:lstStyle/>
           <a:p>
             <a:r>
-              <a:rPr lang="en-US" dirty="0" smtClean="0"/>
-              <a:t>Definition  of SMP</a:t>
-            </a:r>
-          </a:p>
-          <a:p>
-            <a:r>
-              <a:rPr lang="en-US" dirty="0" smtClean="0"/>
+              <a:rPr lang="en-US" b="1" dirty="0" smtClean="0">
+                <a:latin typeface="Calibri" pitchFamily="34" charset="0"/>
+                <a:cs typeface="Calibri" pitchFamily="34" charset="0"/>
+              </a:rPr>
+              <a:t>S</a:t>
+            </a:r>
+            <a:r>
+              <a:rPr lang="en-US" dirty="0" smtClean="0">
+                <a:latin typeface="Calibri" pitchFamily="34" charset="0"/>
+                <a:cs typeface="Calibri" pitchFamily="34" charset="0"/>
+              </a:rPr>
+              <a:t>ymmetric </a:t>
+            </a:r>
+            <a:r>
+              <a:rPr lang="en-US" b="1" dirty="0" err="1" smtClean="0">
+                <a:latin typeface="Calibri" pitchFamily="34" charset="0"/>
+                <a:cs typeface="Calibri" pitchFamily="34" charset="0"/>
+              </a:rPr>
+              <a:t>M</a:t>
+            </a:r>
+            <a:r>
+              <a:rPr lang="en-US" dirty="0" err="1" smtClean="0">
+                <a:latin typeface="Calibri" pitchFamily="34" charset="0"/>
+                <a:cs typeface="Calibri" pitchFamily="34" charset="0"/>
+              </a:rPr>
+              <a:t>ulti</a:t>
+            </a:r>
+            <a:r>
+              <a:rPr lang="en-US" b="1" dirty="0" err="1" smtClean="0">
+                <a:latin typeface="Calibri" pitchFamily="34" charset="0"/>
+                <a:cs typeface="Calibri" pitchFamily="34" charset="0"/>
+              </a:rPr>
+              <a:t>P</a:t>
+            </a:r>
+            <a:r>
+              <a:rPr lang="en-US" dirty="0" err="1" smtClean="0">
+                <a:latin typeface="Calibri" pitchFamily="34" charset="0"/>
+                <a:cs typeface="Calibri" pitchFamily="34" charset="0"/>
+              </a:rPr>
+              <a:t>rocessing</a:t>
+            </a:r>
+            <a:r>
+              <a:rPr lang="en-US" dirty="0" smtClean="0">
+                <a:latin typeface="Calibri" pitchFamily="34" charset="0"/>
+                <a:cs typeface="Calibri" pitchFamily="34" charset="0"/>
+              </a:rPr>
+              <a:t> (SMP): A multiprocessing architecture in which multiple CPUs, residing in one cabinet, share the same memory. SMP systems provide scalability. As business increases, additional CPUs can be added to absorb the increased transaction volume.</a:t>
+            </a:r>
+            <a:br>
+              <a:rPr lang="en-US" dirty="0" smtClean="0">
+                <a:latin typeface="Calibri" pitchFamily="34" charset="0"/>
+                <a:cs typeface="Calibri" pitchFamily="34" charset="0"/>
+              </a:rPr>
+            </a:br>
+            <a:r>
+              <a:rPr lang="en-US" dirty="0" smtClean="0">
+                <a:latin typeface="Calibri" pitchFamily="34" charset="0"/>
+                <a:cs typeface="Calibri" pitchFamily="34" charset="0"/>
+              </a:rPr>
               <a:t/>
             </a:r>
             <a:br>
-              <a:rPr lang="en-US" dirty="0" smtClean="0"/>
+              <a:rPr lang="en-US" dirty="0" smtClean="0">
+                <a:latin typeface="Calibri" pitchFamily="34" charset="0"/>
+                <a:cs typeface="Calibri" pitchFamily="34" charset="0"/>
+              </a:rPr>
             </a:br>
             <a:r>
-              <a:rPr lang="en-US" dirty="0" smtClean="0"/>
-              <a:t>(</a:t>
-            </a:r>
-            <a:r>
-              <a:rPr lang="en-US" b="1" dirty="0" smtClean="0"/>
-              <a:t>S</a:t>
-            </a:r>
-            <a:r>
-              <a:rPr lang="en-US" dirty="0" smtClean="0"/>
-              <a:t>ymmetric </a:t>
-            </a:r>
-            <a:r>
-              <a:rPr lang="en-US" b="1" dirty="0" smtClean="0"/>
-              <a:t>M</a:t>
-            </a:r>
-            <a:r>
-              <a:rPr lang="en-US" dirty="0" smtClean="0"/>
-              <a:t>ulti</a:t>
-            </a:r>
-            <a:r>
-              <a:rPr lang="en-US" b="1" dirty="0" smtClean="0"/>
-              <a:t>P</a:t>
-            </a:r>
-            <a:r>
-              <a:rPr lang="en-US" dirty="0" smtClean="0"/>
-              <a:t>rocessing) A multiprocessing architecture in which multiple CPUs, residing in one cabinet, share the same memory. SMP systems provide scalability. As business increases, additional CPUs can be added to absorb the increased transaction volume.</a:t>
+              <a:rPr lang="en-US" dirty="0" smtClean="0">
+                <a:latin typeface="Calibri" pitchFamily="34" charset="0"/>
+                <a:cs typeface="Calibri" pitchFamily="34" charset="0"/>
+              </a:rPr>
+              <a:t>SMP systems range from two to as many as 32 or more processors. However, if one CPU fails, the entire SMP system is down. Clusters of two or more SMP systems can be used to provide high availability (fault resilience). If one SMP system fails, the others continue to operate.</a:t>
             </a:r>
             <a:br>
-              <a:rPr lang="en-US" dirty="0" smtClean="0"/>
+              <a:rPr lang="en-US" dirty="0" smtClean="0">
+                <a:latin typeface="Calibri" pitchFamily="34" charset="0"/>
+                <a:cs typeface="Calibri" pitchFamily="34" charset="0"/>
+              </a:rPr>
             </a:br>
-            <a:r>
-              <a:rPr lang="en-US" dirty="0" smtClean="0"/>
-              <a:t/>
-            </a:r>
-            <a:br>
-              <a:rPr lang="en-US" dirty="0" smtClean="0"/>
-            </a:br>
-            <a:r>
-              <a:rPr lang="en-US" dirty="0" smtClean="0"/>
-              <a:t>SMP systems range from two to as many as 32 or more processors. However, if one CPU fails, the entire SMP system is down. Clusters of two or more SMP systems can be used to provide high availability (fault resilience). If one SMP system fails, the others continue to operate.</a:t>
-            </a:r>
-            <a:br>
-              <a:rPr lang="en-US" dirty="0" smtClean="0"/>
-            </a:br>
-            <a:endParaRPr lang="en-US" dirty="0"/>
+            <a:endParaRPr lang="en-US" dirty="0">
+              <a:latin typeface="Calibri" pitchFamily="34" charset="0"/>
+              <a:cs typeface="Calibri" pitchFamily="34" charset="0"/>
+            </a:endParaRPr>
           </a:p>
         </p:txBody>
       </p:sp>
@@ -5282,7 +5351,7 @@
             <a:pPr algn="ctr"/>
             <a:r>
               <a:rPr lang="en-US" sz="3600" dirty="0" smtClean="0"/>
-              <a:t>SMP work </a:t>
+              <a:t>SMP Work </a:t>
             </a:r>
             <a:endParaRPr lang="en-US" sz="3600" dirty="0"/>
           </a:p>
@@ -5321,7 +5390,7 @@
         <p:spPr>
           <a:xfrm>
             <a:off x="715223" y="1699261"/>
-            <a:ext cx="7559644" cy="3970318"/>
+            <a:ext cx="7559644" cy="3693319"/>
           </a:xfrm>
           <a:prstGeom prst="rect">
             <a:avLst/>
@@ -5334,61 +5403,88 @@
           <a:lstStyle/>
           <a:p>
             <a:r>
-              <a:rPr lang="en-US" b="1" dirty="0" smtClean="0"/>
+              <a:rPr lang="en-US" b="1" dirty="0" smtClean="0">
+                <a:latin typeface="Calibri" pitchFamily="34" charset="0"/>
+                <a:cs typeface="Calibri" pitchFamily="34" charset="0"/>
+              </a:rPr>
               <a:t>A Pool of Resources</a:t>
             </a:r>
             <a:r>
-              <a:rPr lang="en-US" dirty="0" smtClean="0"/>
+              <a:rPr lang="en-US" dirty="0" smtClean="0">
+                <a:latin typeface="Calibri" pitchFamily="34" charset="0"/>
+                <a:cs typeface="Calibri" pitchFamily="34" charset="0"/>
+              </a:rPr>
               <a:t/>
             </a:r>
             <a:br>
-              <a:rPr lang="en-US" dirty="0" smtClean="0"/>
+              <a:rPr lang="en-US" dirty="0" smtClean="0">
+                <a:latin typeface="Calibri" pitchFamily="34" charset="0"/>
+                <a:cs typeface="Calibri" pitchFamily="34" charset="0"/>
+              </a:rPr>
             </a:br>
             <a:r>
-              <a:rPr lang="en-US" dirty="0" smtClean="0"/>
-              <a:t>One of the CPUs boots the system and loads the SMP operating system, which brings the other CPUs online. There is only one instance of the operating system and one instance of </a:t>
-            </a:r>
-            <a:r>
-              <a:rPr lang="en-US" dirty="0" smtClean="0"/>
-              <a:t>an</a:t>
-            </a:r>
-            <a:r>
-              <a:rPr lang="en-US" dirty="0" smtClean="0"/>
-              <a:t> </a:t>
-            </a:r>
-            <a:r>
-              <a:rPr lang="en-US" dirty="0" smtClean="0"/>
-              <a:t>application in memory. The operating system uses the CPUs as a pool of processing resources, all executing simultaneously, either processing data or in an idle loop waiting to do something.</a:t>
+              <a:rPr lang="en-US" dirty="0" smtClean="0">
+                <a:latin typeface="Calibri" pitchFamily="34" charset="0"/>
+                <a:cs typeface="Calibri" pitchFamily="34" charset="0"/>
+              </a:rPr>
+              <a:t>One of the CPUs boots the system and loads the SMP operating system, which brings the other CPUs online. There is only one instance of the operating system and one instance of an application in memory. The operating system uses the CPUs as a pool of processing resources, all executing simultaneously, either processing data or in an idle loop waiting to do something.</a:t>
             </a:r>
             <a:br>
-              <a:rPr lang="en-US" dirty="0" smtClean="0"/>
+              <a:rPr lang="en-US" dirty="0" smtClean="0">
+                <a:latin typeface="Calibri" pitchFamily="34" charset="0"/>
+                <a:cs typeface="Calibri" pitchFamily="34" charset="0"/>
+              </a:rPr>
             </a:br>
             <a:r>
-              <a:rPr lang="en-US" dirty="0" smtClean="0"/>
+              <a:rPr lang="en-US" dirty="0" smtClean="0">
+                <a:latin typeface="Calibri" pitchFamily="34" charset="0"/>
+                <a:cs typeface="Calibri" pitchFamily="34" charset="0"/>
+              </a:rPr>
               <a:t/>
             </a:r>
             <a:br>
-              <a:rPr lang="en-US" dirty="0" smtClean="0"/>
+              <a:rPr lang="en-US" dirty="0" smtClean="0">
+                <a:latin typeface="Calibri" pitchFamily="34" charset="0"/>
+                <a:cs typeface="Calibri" pitchFamily="34" charset="0"/>
+              </a:rPr>
             </a:br>
             <a:r>
-              <a:rPr lang="en-US" b="1" dirty="0" smtClean="0"/>
+              <a:rPr lang="en-US" b="1" dirty="0" smtClean="0">
+                <a:latin typeface="Calibri" pitchFamily="34" charset="0"/>
+                <a:cs typeface="Calibri" pitchFamily="34" charset="0"/>
+              </a:rPr>
               <a:t>Speed Up</a:t>
             </a:r>
             <a:r>
-              <a:rPr lang="en-US" dirty="0" smtClean="0"/>
+              <a:rPr lang="en-US" dirty="0" smtClean="0">
+                <a:latin typeface="Calibri" pitchFamily="34" charset="0"/>
+                <a:cs typeface="Calibri" pitchFamily="34" charset="0"/>
+              </a:rPr>
               <a:t/>
             </a:r>
             <a:br>
-              <a:rPr lang="en-US" dirty="0" smtClean="0"/>
+              <a:rPr lang="en-US" dirty="0" smtClean="0">
+                <a:latin typeface="Calibri" pitchFamily="34" charset="0"/>
+                <a:cs typeface="Calibri" pitchFamily="34" charset="0"/>
+              </a:rPr>
             </a:br>
             <a:r>
-              <a:rPr lang="en-US" dirty="0" smtClean="0"/>
+              <a:rPr lang="en-US" dirty="0" smtClean="0">
+                <a:latin typeface="Calibri" pitchFamily="34" charset="0"/>
+                <a:cs typeface="Calibri" pitchFamily="34" charset="0"/>
+              </a:rPr>
               <a:t>SMP speeds up the processes that can be overlapped such as running multiple applications simultaneously. If an application is multithreaded, which allows for concurrent operations within the application itself, then SMP can improve the performance of that single application.</a:t>
             </a:r>
             <a:br>
-              <a:rPr lang="en-US" dirty="0" smtClean="0"/>
+              <a:rPr lang="en-US" dirty="0" smtClean="0">
+                <a:latin typeface="Calibri" pitchFamily="34" charset="0"/>
+                <a:cs typeface="Calibri" pitchFamily="34" charset="0"/>
+              </a:rPr>
             </a:br>
-            <a:endParaRPr lang="en-US" dirty="0"/>
+            <a:endParaRPr lang="en-US" dirty="0">
+              <a:latin typeface="Calibri" pitchFamily="34" charset="0"/>
+              <a:cs typeface="Calibri" pitchFamily="34" charset="0"/>
+            </a:endParaRPr>
           </a:p>
         </p:txBody>
       </p:sp>
@@ -5441,7 +5537,7 @@
           <a:p>
             <a:r>
               <a:rPr lang="en-US" dirty="0" smtClean="0"/>
-              <a:t>SMP high points</a:t>
+              <a:t>SMP High Points</a:t>
             </a:r>
             <a:endParaRPr lang="en-US" dirty="0"/>
           </a:p>
@@ -5467,24 +5563,28 @@
           <a:bodyPr/>
           <a:lstStyle/>
           <a:p>
+            <a:pPr marL="365760" indent="-365760"/>
             <a:r>
               <a:rPr lang="en-US" sz="2800" dirty="0" smtClean="0"/>
               <a:t>A single operating system</a:t>
             </a:r>
           </a:p>
           <a:p>
+            <a:pPr marL="365760" indent="-365760"/>
             <a:r>
               <a:rPr lang="en-US" sz="2800" dirty="0" smtClean="0"/>
               <a:t>An application can be distributed between multiple cores</a:t>
             </a:r>
           </a:p>
           <a:p>
+            <a:pPr marL="365760" indent="-365760"/>
             <a:r>
               <a:rPr lang="en-US" sz="2800" dirty="0" smtClean="0"/>
               <a:t>Memories can be global to all threads or local to each thread</a:t>
             </a:r>
           </a:p>
           <a:p>
+            <a:pPr marL="365760" indent="-365760"/>
             <a:r>
               <a:rPr lang="en-US" sz="2800" dirty="0" smtClean="0"/>
               <a:t>Pthreads provide the parallelism  </a:t>
@@ -5608,7 +5708,7 @@
         <p:spPr>
           <a:xfrm>
             <a:off x="389299" y="1619702"/>
-            <a:ext cx="7831248" cy="4247317"/>
+            <a:ext cx="7831248" cy="4031873"/>
           </a:xfrm>
           <a:prstGeom prst="rect">
             <a:avLst/>
@@ -5620,47 +5720,83 @@
           </a:bodyPr>
           <a:lstStyle/>
           <a:p>
-            <a:r>
-              <a:rPr lang="en-US" dirty="0" smtClean="0"/>
-              <a:t>A process is created by the operating system to run an application. Starting a process requires a great amount of overhead</a:t>
-            </a:r>
-          </a:p>
-          <a:p>
-            <a:endParaRPr lang="en-US" dirty="0" smtClean="0"/>
-          </a:p>
-          <a:p>
-            <a:r>
-              <a:rPr lang="en-US" dirty="0" smtClean="0"/>
-              <a:t>A process might have multiple procedures each one is somewhat independent from other procedures. A system that can schedule these procedures in an efficient way is multi-thread system </a:t>
-            </a:r>
-          </a:p>
-          <a:p>
-            <a:endParaRPr lang="en-US" dirty="0" smtClean="0"/>
-          </a:p>
-          <a:p>
-            <a:r>
-              <a:rPr lang="en-US" dirty="0" smtClean="0"/>
-              <a:t>A thread is defined as an independent stream of instructions that can be scheduled to run as such by the operating system and requires much less overhead than a process</a:t>
-            </a:r>
-          </a:p>
-          <a:p>
-            <a:endParaRPr lang="en-US" dirty="0" smtClean="0"/>
-          </a:p>
-          <a:p>
-            <a:r>
-              <a:rPr lang="en-US" dirty="0" smtClean="0"/>
-              <a:t>POSIX threads (pthreads)  is an IEEE standard that defines portable (between different hardware) threads</a:t>
-            </a:r>
-          </a:p>
-          <a:p>
-            <a:endParaRPr lang="en-US" dirty="0" smtClean="0"/>
-          </a:p>
-          <a:p>
-            <a:r>
-              <a:rPr lang="en-US" dirty="0" smtClean="0"/>
+            <a:pPr marL="365760" indent="-365760" eaLnBrk="0" hangingPunct="0">
+              <a:spcBef>
+                <a:spcPts val="800"/>
+              </a:spcBef>
+              <a:buChar char="•"/>
+            </a:pPr>
+            <a:r>
+              <a:rPr lang="en-US" sz="2000" dirty="0" smtClean="0">
+                <a:latin typeface="Calibri" pitchFamily="34" charset="0"/>
+                <a:cs typeface="Calibri" pitchFamily="34" charset="0"/>
+              </a:rPr>
+              <a:t>A process is created by the operating system to run an application. Starting a process requires a great amount of overhead.</a:t>
+            </a:r>
+          </a:p>
+          <a:p>
+            <a:pPr marL="365760" indent="-365760" eaLnBrk="0" hangingPunct="0">
+              <a:spcBef>
+                <a:spcPts val="800"/>
+              </a:spcBef>
+              <a:buChar char="•"/>
+            </a:pPr>
+            <a:r>
+              <a:rPr lang="en-US" sz="2000" dirty="0" smtClean="0">
+                <a:latin typeface="Calibri" pitchFamily="34" charset="0"/>
+                <a:cs typeface="Calibri" pitchFamily="34" charset="0"/>
+              </a:rPr>
+              <a:t>A process might have multiple procedures each one is somewhat independent from other procedures. A system that can schedule these procedures in an efficient way is multi-thread system.</a:t>
+            </a:r>
+          </a:p>
+          <a:p>
+            <a:pPr marL="365760" indent="-365760" eaLnBrk="0" hangingPunct="0">
+              <a:spcBef>
+                <a:spcPts val="800"/>
+              </a:spcBef>
+              <a:buChar char="•"/>
+            </a:pPr>
+            <a:r>
+              <a:rPr lang="en-US" sz="2000" dirty="0" smtClean="0">
+                <a:latin typeface="Calibri" pitchFamily="34" charset="0"/>
+                <a:cs typeface="Calibri" pitchFamily="34" charset="0"/>
+              </a:rPr>
+              <a:t>A thread is defined as an independent stream of instructions that can be scheduled to run as such by the operating system and requires much less overhead than a process.</a:t>
+            </a:r>
+          </a:p>
+          <a:p>
+            <a:pPr marL="365760" indent="-365760" eaLnBrk="0" hangingPunct="0">
+              <a:spcBef>
+                <a:spcPts val="800"/>
+              </a:spcBef>
+              <a:buChar char="•"/>
+            </a:pPr>
+            <a:r>
+              <a:rPr lang="en-US" sz="2000" dirty="0" smtClean="0">
+                <a:latin typeface="Calibri" pitchFamily="34" charset="0"/>
+                <a:cs typeface="Calibri" pitchFamily="34" charset="0"/>
+              </a:rPr>
+              <a:t>POSIX threads (pthreads) is an IEEE standard that defines portable (between different hardware) threads.</a:t>
+            </a:r>
+          </a:p>
+          <a:p>
+            <a:endParaRPr lang="en-US" dirty="0" smtClean="0">
+              <a:latin typeface="Calibri" pitchFamily="34" charset="0"/>
+              <a:cs typeface="Calibri" pitchFamily="34" charset="0"/>
+            </a:endParaRPr>
+          </a:p>
+          <a:p>
+            <a:r>
+              <a:rPr lang="en-US" dirty="0" smtClean="0">
+                <a:latin typeface="Calibri" pitchFamily="34" charset="0"/>
+                <a:cs typeface="Calibri" pitchFamily="34" charset="0"/>
+              </a:rPr>
               <a:t> </a:t>
             </a:r>
-            <a:endParaRPr lang="en-US" dirty="0"/>
+            <a:endParaRPr lang="en-US" dirty="0">
+              <a:latin typeface="Calibri" pitchFamily="34" charset="0"/>
+              <a:cs typeface="Calibri" pitchFamily="34" charset="0"/>
+            </a:endParaRPr>
           </a:p>
         </p:txBody>
       </p:sp>
@@ -5760,7 +5896,7 @@
         <p:spPr>
           <a:xfrm>
             <a:off x="389299" y="1619702"/>
-            <a:ext cx="7831248" cy="3693319"/>
+            <a:ext cx="7831248" cy="3590727"/>
           </a:xfrm>
           <a:prstGeom prst="rect">
             <a:avLst/>
@@ -5772,41 +5908,74 @@
           </a:bodyPr>
           <a:lstStyle/>
           <a:p>
-            <a:r>
-              <a:rPr lang="en-US" dirty="0" smtClean="0"/>
-              <a:t>Pthreads are defined as a set of C language programming types and procedure calls, implemented with a pthread.h header/include file and a thread library</a:t>
-            </a:r>
-          </a:p>
-          <a:p>
-            <a:endParaRPr lang="en-US" dirty="0" smtClean="0"/>
-          </a:p>
-          <a:p>
-            <a:r>
-              <a:rPr lang="en-US" dirty="0" smtClean="0"/>
-              <a:t>In terms of performance cost, pthreads require much less resources to be created and managed </a:t>
-            </a:r>
-          </a:p>
-          <a:p>
-            <a:endParaRPr lang="en-US" dirty="0" smtClean="0"/>
-          </a:p>
-          <a:p>
-            <a:r>
-              <a:rPr lang="en-US" dirty="0" smtClean="0"/>
+            <a:pPr marL="365760" indent="-365760" eaLnBrk="0" hangingPunct="0">
+              <a:spcBef>
+                <a:spcPts val="800"/>
+              </a:spcBef>
+              <a:buChar char="•"/>
+            </a:pPr>
+            <a:r>
+              <a:rPr lang="en-US" sz="2000" dirty="0" smtClean="0">
+                <a:latin typeface="Calibri" pitchFamily="34" charset="0"/>
+                <a:cs typeface="Calibri" pitchFamily="34" charset="0"/>
+              </a:rPr>
+              <a:t>Pthreads are defined as a set of C language programming types and procedure calls, implemented with a pthread.h header/include file and a thread library.</a:t>
+            </a:r>
+          </a:p>
+          <a:p>
+            <a:pPr marL="365760" indent="-365760" eaLnBrk="0" hangingPunct="0">
+              <a:spcBef>
+                <a:spcPts val="800"/>
+              </a:spcBef>
+              <a:buChar char="•"/>
+            </a:pPr>
+            <a:r>
+              <a:rPr lang="en-US" sz="2000" dirty="0" smtClean="0">
+                <a:latin typeface="Calibri" pitchFamily="34" charset="0"/>
+                <a:cs typeface="Calibri" pitchFamily="34" charset="0"/>
+              </a:rPr>
+              <a:t>In terms of performance cost, pthreads require much less resources to be created and managed .</a:t>
+            </a:r>
+          </a:p>
+          <a:p>
+            <a:pPr marL="365760" indent="-365760" eaLnBrk="0" hangingPunct="0">
+              <a:spcBef>
+                <a:spcPts val="800"/>
+              </a:spcBef>
+              <a:buChar char="•"/>
+            </a:pPr>
+            <a:r>
+              <a:rPr lang="en-US" sz="2000" dirty="0" smtClean="0">
+                <a:latin typeface="Calibri" pitchFamily="34" charset="0"/>
+                <a:cs typeface="Calibri" pitchFamily="34" charset="0"/>
+              </a:rPr>
               <a:t>All threads within a process share the same address space. Inter-thread communication is more efficient and easier than inter-process communication.</a:t>
             </a:r>
           </a:p>
           <a:p>
-            <a:endParaRPr lang="en-US" dirty="0" smtClean="0"/>
-          </a:p>
-          <a:p>
-            <a:endParaRPr lang="en-US" dirty="0" smtClean="0"/>
-          </a:p>
-          <a:p>
-            <a:r>
-              <a:rPr lang="en-US" dirty="0" smtClean="0"/>
+            <a:endParaRPr lang="en-US" dirty="0" smtClean="0">
+              <a:latin typeface="Calibri" pitchFamily="34" charset="0"/>
+              <a:cs typeface="Calibri" pitchFamily="34" charset="0"/>
+            </a:endParaRPr>
+          </a:p>
+          <a:p>
+            <a:endParaRPr lang="en-US" dirty="0" smtClean="0">
+              <a:latin typeface="Calibri" pitchFamily="34" charset="0"/>
+              <a:cs typeface="Calibri" pitchFamily="34" charset="0"/>
+            </a:endParaRPr>
+          </a:p>
+          <a:p>
+            <a:r>
+              <a:rPr lang="en-US" dirty="0" smtClean="0">
+                <a:latin typeface="Calibri" pitchFamily="34" charset="0"/>
+                <a:cs typeface="Calibri" pitchFamily="34" charset="0"/>
+              </a:rPr>
               <a:t> </a:t>
             </a:r>
-            <a:endParaRPr lang="en-US" dirty="0"/>
+            <a:endParaRPr lang="en-US" dirty="0">
+              <a:latin typeface="Calibri" pitchFamily="34" charset="0"/>
+              <a:cs typeface="Calibri" pitchFamily="34" charset="0"/>
+            </a:endParaRPr>
           </a:p>
         </p:txBody>
       </p:sp>
@@ -5906,7 +6075,7 @@
         <p:spPr>
           <a:xfrm>
             <a:off x="389299" y="1619702"/>
-            <a:ext cx="7831248" cy="3693319"/>
+            <a:ext cx="7831248" cy="4370427"/>
           </a:xfrm>
           <a:prstGeom prst="rect">
             <a:avLst/>
@@ -5919,71 +6088,103 @@
           <a:lstStyle/>
           <a:p>
             <a:r>
-              <a:rPr lang="en-US" dirty="0" smtClean="0"/>
+              <a:rPr lang="en-US" sz="2400" dirty="0" smtClean="0">
+                <a:latin typeface="Calibri" pitchFamily="34" charset="0"/>
+                <a:cs typeface="Calibri" pitchFamily="34" charset="0"/>
+              </a:rPr>
               <a:t>Several common models for threaded programs exist: </a:t>
             </a:r>
           </a:p>
           <a:p>
-            <a:pPr lvl="1"/>
-            <a:r>
-              <a:rPr lang="en-US" b="1" i="1" dirty="0" smtClean="0"/>
-              <a:t>Master/slaves:</a:t>
-            </a:r>
-            <a:r>
-              <a:rPr lang="en-US" dirty="0" smtClean="0"/>
-              <a:t> a single thread, the </a:t>
-            </a:r>
-            <a:r>
-              <a:rPr lang="en-US" i="1" dirty="0" smtClean="0"/>
-              <a:t>master</a:t>
-            </a:r>
-            <a:r>
-              <a:rPr lang="en-US" dirty="0" smtClean="0"/>
-              <a:t> assigns work to other threads, the </a:t>
-            </a:r>
-            <a:r>
-              <a:rPr lang="en-US" i="1" dirty="0" smtClean="0"/>
-              <a:t>slaves</a:t>
-            </a:r>
-            <a:r>
-              <a:rPr lang="en-US" dirty="0" smtClean="0"/>
-              <a:t>. Typically, the master handles all input and parcels out work to the other tasks. At least two forms of the master/slaves model are common: static slaves pool and dynamic slaves pool. </a:t>
-            </a:r>
-          </a:p>
-          <a:p>
-            <a:pPr lvl="1"/>
-            <a:r>
-              <a:rPr lang="en-US" b="1" i="1" dirty="0" smtClean="0"/>
-              <a:t>Pipeline:</a:t>
-            </a:r>
-            <a:r>
-              <a:rPr lang="en-US" dirty="0" smtClean="0"/>
-              <a:t> a task is broken into a series of sub-operations, each of which is handled in series, but concurrently, by a different thread. An automobile assembly line best describes this model. </a:t>
-            </a:r>
-          </a:p>
-          <a:p>
-            <a:pPr lvl="1"/>
-            <a:r>
-              <a:rPr lang="en-US" b="1" i="1" dirty="0" smtClean="0"/>
-              <a:t>Peer:</a:t>
-            </a:r>
-            <a:r>
-              <a:rPr lang="en-US" dirty="0" smtClean="0"/>
-              <a:t> similar to the master/slave model, but after the main thread creates other threads, it participates in the work. </a:t>
-            </a:r>
-          </a:p>
-          <a:p>
-            <a:endParaRPr lang="en-US" dirty="0" smtClean="0"/>
-          </a:p>
-          <a:p>
-            <a:endParaRPr lang="en-US" dirty="0" smtClean="0"/>
-          </a:p>
-          <a:p>
-            <a:r>
-              <a:rPr lang="en-US" dirty="0" smtClean="0"/>
+            <a:pPr marL="365760" lvl="1" indent="-365760" eaLnBrk="0" hangingPunct="0">
+              <a:spcBef>
+                <a:spcPts val="800"/>
+              </a:spcBef>
+              <a:buChar char="•"/>
+            </a:pPr>
+            <a:r>
+              <a:rPr lang="en-US" sz="2000" b="1" dirty="0" smtClean="0">
+                <a:latin typeface="Calibri" pitchFamily="34" charset="0"/>
+                <a:cs typeface="Calibri" pitchFamily="34" charset="0"/>
+              </a:rPr>
+              <a:t>Master/slaves: </a:t>
+            </a:r>
+            <a:r>
+              <a:rPr lang="en-US" sz="2000" dirty="0" smtClean="0">
+                <a:latin typeface="Calibri" pitchFamily="34" charset="0"/>
+                <a:cs typeface="Calibri" pitchFamily="34" charset="0"/>
+              </a:rPr>
+              <a:t>a single thread, the master assigns work to other threads, the slaves. Typically, the master handles all input and parcels out work to the other tasks. At least two forms of the master/slaves model are common: static slaves pool and dynamic slaves pool. </a:t>
+            </a:r>
+          </a:p>
+          <a:p>
+            <a:pPr marL="365760" lvl="1" indent="-365760" eaLnBrk="0" hangingPunct="0">
+              <a:spcBef>
+                <a:spcPts val="800"/>
+              </a:spcBef>
+              <a:buChar char="•"/>
+            </a:pPr>
+            <a:r>
+              <a:rPr lang="en-US" sz="2000" b="1" dirty="0" smtClean="0">
+                <a:latin typeface="Calibri" pitchFamily="34" charset="0"/>
+                <a:cs typeface="Calibri" pitchFamily="34" charset="0"/>
+              </a:rPr>
+              <a:t>Pipeline: </a:t>
+            </a:r>
+            <a:r>
+              <a:rPr lang="en-US" sz="2000" dirty="0" smtClean="0">
+                <a:latin typeface="Calibri" pitchFamily="34" charset="0"/>
+                <a:cs typeface="Calibri" pitchFamily="34" charset="0"/>
+              </a:rPr>
+              <a:t>a task is broken into a series of sub-operations, each of which is handled in series, but concurrently, by a different thread. An automobile assembly line best describes this model. </a:t>
+            </a:r>
+          </a:p>
+          <a:p>
+            <a:pPr marL="365760" lvl="1" indent="-365760" eaLnBrk="0" hangingPunct="0">
+              <a:spcBef>
+                <a:spcPts val="800"/>
+              </a:spcBef>
+              <a:buChar char="•"/>
+            </a:pPr>
+            <a:r>
+              <a:rPr lang="en-US" sz="2000" b="1" dirty="0" smtClean="0">
+                <a:latin typeface="Calibri" pitchFamily="34" charset="0"/>
+                <a:cs typeface="Calibri" pitchFamily="34" charset="0"/>
+              </a:rPr>
+              <a:t>Peer: </a:t>
+            </a:r>
+            <a:r>
+              <a:rPr lang="en-US" sz="2000" dirty="0" smtClean="0">
+                <a:latin typeface="Calibri" pitchFamily="34" charset="0"/>
+                <a:cs typeface="Calibri" pitchFamily="34" charset="0"/>
+              </a:rPr>
+              <a:t>similar to the master/slave model, but after the main thread creates other threads, it participates in the work. </a:t>
+            </a:r>
+          </a:p>
+          <a:p>
+            <a:endParaRPr lang="en-US" dirty="0" smtClean="0">
+              <a:latin typeface="Calibri" pitchFamily="34" charset="0"/>
+              <a:cs typeface="Calibri" pitchFamily="34" charset="0"/>
+            </a:endParaRPr>
+          </a:p>
+          <a:p>
+            <a:endParaRPr lang="en-US" dirty="0" smtClean="0">
+              <a:latin typeface="Calibri" pitchFamily="34" charset="0"/>
+              <a:cs typeface="Calibri" pitchFamily="34" charset="0"/>
+            </a:endParaRPr>
+          </a:p>
+          <a:p>
+            <a:r>
+              <a:rPr lang="en-US" dirty="0" smtClean="0">
+                <a:latin typeface="Calibri" pitchFamily="34" charset="0"/>
+                <a:cs typeface="Calibri" pitchFamily="34" charset="0"/>
+              </a:rPr>
               <a:t> </a:t>
             </a:r>
-            <a:endParaRPr lang="en-US" dirty="0"/>
+            <a:endParaRPr lang="en-US" dirty="0">
+              <a:latin typeface="Calibri" pitchFamily="34" charset="0"/>
+              <a:cs typeface="Calibri" pitchFamily="34" charset="0"/>
+            </a:endParaRPr>
           </a:p>
         </p:txBody>
       </p:sp>
@@ -6031,7 +6232,7 @@
         </p:nvSpPr>
         <p:spPr>
           <a:xfrm>
-            <a:off x="685800" y="304801"/>
+            <a:off x="707231" y="0"/>
             <a:ext cx="7772400" cy="914400"/>
           </a:xfrm>
         </p:spPr>
@@ -6083,7 +6284,7 @@
         <p:spPr>
           <a:xfrm>
             <a:off x="334978" y="958799"/>
-            <a:ext cx="7831248" cy="2308324"/>
+            <a:ext cx="7831248" cy="2082621"/>
           </a:xfrm>
           <a:prstGeom prst="rect">
             <a:avLst/>
@@ -6095,58 +6296,71 @@
           </a:bodyPr>
           <a:lstStyle/>
           <a:p>
-            <a:pPr>
+            <a:pPr marL="365760" indent="-365760" eaLnBrk="0" hangingPunct="0">
+              <a:spcBef>
+                <a:spcPts val="800"/>
+              </a:spcBef>
               <a:buFont typeface="Arial" pitchFamily="34" charset="0"/>
               <a:buChar char="•"/>
             </a:pPr>
             <a:r>
-              <a:rPr lang="en-US" dirty="0" smtClean="0"/>
-              <a:t> All threads have access to the same global, shared memory </a:t>
-            </a:r>
-          </a:p>
-          <a:p>
-            <a:pPr>
+              <a:rPr lang="en-US" sz="2000" dirty="0" smtClean="0">
+                <a:latin typeface="Calibri" pitchFamily="34" charset="0"/>
+                <a:cs typeface="Calibri" pitchFamily="34" charset="0"/>
+              </a:rPr>
+              <a:t>All threads have access to the same global, shared memory.</a:t>
+            </a:r>
+          </a:p>
+          <a:p>
+            <a:pPr marL="365760" indent="-365760" eaLnBrk="0" hangingPunct="0">
+              <a:spcBef>
+                <a:spcPts val="800"/>
+              </a:spcBef>
               <a:buFont typeface="Arial" pitchFamily="34" charset="0"/>
               <a:buChar char="•"/>
             </a:pPr>
-            <a:endParaRPr lang="en-US" dirty="0" smtClean="0"/>
-          </a:p>
-          <a:p>
-            <a:pPr>
+            <a:r>
+              <a:rPr lang="en-US" sz="2000" dirty="0" smtClean="0">
+                <a:latin typeface="Calibri" pitchFamily="34" charset="0"/>
+                <a:cs typeface="Calibri" pitchFamily="34" charset="0"/>
+              </a:rPr>
+              <a:t>Threads also have their own private data.</a:t>
+            </a:r>
+          </a:p>
+          <a:p>
+            <a:pPr marL="365760" indent="-365760" eaLnBrk="0" hangingPunct="0">
+              <a:spcBef>
+                <a:spcPts val="800"/>
+              </a:spcBef>
               <a:buFont typeface="Arial" pitchFamily="34" charset="0"/>
               <a:buChar char="•"/>
             </a:pPr>
             <a:r>
-              <a:rPr lang="en-US" dirty="0" smtClean="0"/>
-              <a:t> Threads also have their own private data </a:t>
-            </a:r>
-          </a:p>
-          <a:p>
-            <a:pPr>
-              <a:buFont typeface="Arial" pitchFamily="34" charset="0"/>
-              <a:buChar char="•"/>
-            </a:pPr>
-            <a:endParaRPr lang="en-US" dirty="0" smtClean="0"/>
-          </a:p>
-          <a:p>
-            <a:pPr>
-              <a:buFont typeface="Arial" pitchFamily="34" charset="0"/>
-              <a:buChar char="•"/>
-            </a:pPr>
-            <a:r>
-              <a:rPr lang="en-US" dirty="0" smtClean="0"/>
-              <a:t> Programmers are responsible for synchronizing access (protecting) globally shared data. </a:t>
-            </a:r>
-          </a:p>
-          <a:p>
-            <a:endParaRPr lang="en-US" dirty="0" smtClean="0"/>
-          </a:p>
-          <a:p>
-            <a:r>
-              <a:rPr lang="en-US" dirty="0" smtClean="0"/>
+              <a:rPr lang="en-US" sz="2000" dirty="0" smtClean="0">
+                <a:latin typeface="Calibri" pitchFamily="34" charset="0"/>
+                <a:cs typeface="Calibri" pitchFamily="34" charset="0"/>
+              </a:rPr>
+              <a:t>Programmers are responsible for synchronizing access (protecting) globally shared data. </a:t>
+            </a:r>
+          </a:p>
+          <a:p>
+            <a:endParaRPr lang="en-US" dirty="0" smtClean="0">
+              <a:latin typeface="Calibri" pitchFamily="34" charset="0"/>
+              <a:cs typeface="Calibri" pitchFamily="34" charset="0"/>
+            </a:endParaRPr>
+          </a:p>
+          <a:p>
+            <a:r>
+              <a:rPr lang="en-US" dirty="0" smtClean="0">
+                <a:latin typeface="Calibri" pitchFamily="34" charset="0"/>
+                <a:cs typeface="Calibri" pitchFamily="34" charset="0"/>
+              </a:rPr>
               <a:t> </a:t>
             </a:r>
-            <a:endParaRPr lang="en-US" dirty="0"/>
+            <a:endParaRPr lang="en-US" dirty="0">
+              <a:latin typeface="Calibri" pitchFamily="34" charset="0"/>
+              <a:cs typeface="Calibri" pitchFamily="34" charset="0"/>
+            </a:endParaRPr>
           </a:p>
         </p:txBody>
       </p:sp>
@@ -6227,7 +6441,7 @@
             <a:pPr algn="ctr"/>
             <a:r>
               <a:rPr lang="en-US" sz="3600" dirty="0" smtClean="0"/>
-              <a:t>Memory protection MUTEX</a:t>
+              <a:t>Memory Protection MUTEX</a:t>
             </a:r>
             <a:endParaRPr lang="en-US" sz="3600" dirty="0"/>
           </a:p>
@@ -6266,7 +6480,7 @@
         <p:spPr>
           <a:xfrm>
             <a:off x="389299" y="1619702"/>
-            <a:ext cx="7831248" cy="2585323"/>
+            <a:ext cx="7831248" cy="2390398"/>
           </a:xfrm>
           <a:prstGeom prst="rect">
             <a:avLst/>
@@ -6278,27 +6492,51 @@
           </a:bodyPr>
           <a:lstStyle/>
           <a:p>
-            <a:r>
-              <a:rPr lang="en-US" dirty="0" smtClean="0"/>
-              <a:t>Mutex is an abbreviation for "mutual exclusion"</a:t>
-            </a:r>
-          </a:p>
-          <a:p>
-            <a:endParaRPr lang="en-US" dirty="0" smtClean="0"/>
-          </a:p>
-          <a:p>
-            <a:r>
-              <a:rPr lang="en-US" dirty="0" smtClean="0"/>
-              <a:t>A mutex variable is a "lock" (a semaphore), protecting access to a shared data resource to prevent “race” conditions</a:t>
-            </a:r>
-          </a:p>
-          <a:p>
-            <a:endParaRPr lang="en-US" dirty="0" smtClean="0"/>
-          </a:p>
-          <a:p>
-            <a:r>
-              <a:rPr lang="en-US" dirty="0" smtClean="0"/>
-              <a:t>Using MUTEX ensures that when a thread lock a mutex variable, no other thread can access the same variable until the mutex is released</a:t>
+            <a:pPr marL="365760" indent="-365760" eaLnBrk="0" hangingPunct="0">
+              <a:spcBef>
+                <a:spcPts val="800"/>
+              </a:spcBef>
+              <a:buFont typeface="Arial" pitchFamily="34" charset="0"/>
+              <a:buChar char="•"/>
+            </a:pPr>
+            <a:r>
+              <a:rPr lang="en-US" sz="2000" dirty="0" smtClean="0">
+                <a:latin typeface="Calibri" pitchFamily="34" charset="0"/>
+                <a:cs typeface="Calibri" pitchFamily="34" charset="0"/>
+              </a:rPr>
+              <a:t>Mutex is an abbreviation for "mutual exclusion.“</a:t>
+            </a:r>
+          </a:p>
+          <a:p>
+            <a:pPr marL="365760" indent="-365760" eaLnBrk="0" hangingPunct="0">
+              <a:spcBef>
+                <a:spcPts val="800"/>
+              </a:spcBef>
+              <a:buFont typeface="Arial" pitchFamily="34" charset="0"/>
+              <a:buChar char="•"/>
+            </a:pPr>
+            <a:r>
+              <a:rPr lang="en-US" sz="2000" dirty="0" smtClean="0">
+                <a:latin typeface="Calibri" pitchFamily="34" charset="0"/>
+                <a:cs typeface="Calibri" pitchFamily="34" charset="0"/>
+              </a:rPr>
+              <a:t>A mutex variable is a "lock" (a semaphore), protecting access to a shared data resource to prevent “race” conditions.</a:t>
+            </a:r>
+          </a:p>
+          <a:p>
+            <a:pPr marL="365760" indent="-365760" eaLnBrk="0" hangingPunct="0">
+              <a:spcBef>
+                <a:spcPts val="800"/>
+              </a:spcBef>
+              <a:buFont typeface="Arial" pitchFamily="34" charset="0"/>
+              <a:buChar char="•"/>
+            </a:pPr>
+            <a:r>
+              <a:rPr lang="en-US" sz="2000" dirty="0" smtClean="0">
+                <a:latin typeface="Calibri" pitchFamily="34" charset="0"/>
+                <a:cs typeface="Calibri" pitchFamily="34" charset="0"/>
+              </a:rPr>
+              <a:t>Using MUTEX ensures that when a thread lock a mutex variable, no other thread can access the same variable until the mutex is released.</a:t>
             </a:r>
           </a:p>
           <a:p>

</xml_diff>